<commit_message>
added optimisation with no outliers
</commit_message>
<xml_diff>
--- a/presentation/presentation_draft_cat.pptx
+++ b/presentation/presentation_draft_cat.pptx
@@ -266,7 +266,7 @@
           <a:p>
             <a:fld id="{4D0BBD41-1117-4791-B15E-D06494A852BF}" type="datetimeFigureOut">
               <a:rPr lang="en-GB" smtClean="0"/>
-              <a:t>02/04/2024</a:t>
+              <a:t>03/04/2024</a:t>
             </a:fld>
             <a:endParaRPr lang="en-GB"/>
           </a:p>
@@ -466,7 +466,7 @@
           <a:p>
             <a:fld id="{4D0BBD41-1117-4791-B15E-D06494A852BF}" type="datetimeFigureOut">
               <a:rPr lang="en-GB" smtClean="0"/>
-              <a:t>02/04/2024</a:t>
+              <a:t>03/04/2024</a:t>
             </a:fld>
             <a:endParaRPr lang="en-GB"/>
           </a:p>
@@ -676,7 +676,7 @@
           <a:p>
             <a:fld id="{4D0BBD41-1117-4791-B15E-D06494A852BF}" type="datetimeFigureOut">
               <a:rPr lang="en-GB" smtClean="0"/>
-              <a:t>02/04/2024</a:t>
+              <a:t>03/04/2024</a:t>
             </a:fld>
             <a:endParaRPr lang="en-GB"/>
           </a:p>
@@ -876,7 +876,7 @@
           <a:p>
             <a:fld id="{4D0BBD41-1117-4791-B15E-D06494A852BF}" type="datetimeFigureOut">
               <a:rPr lang="en-GB" smtClean="0"/>
-              <a:t>02/04/2024</a:t>
+              <a:t>03/04/2024</a:t>
             </a:fld>
             <a:endParaRPr lang="en-GB"/>
           </a:p>
@@ -1152,7 +1152,7 @@
           <a:p>
             <a:fld id="{4D0BBD41-1117-4791-B15E-D06494A852BF}" type="datetimeFigureOut">
               <a:rPr lang="en-GB" smtClean="0"/>
-              <a:t>02/04/2024</a:t>
+              <a:t>03/04/2024</a:t>
             </a:fld>
             <a:endParaRPr lang="en-GB"/>
           </a:p>
@@ -1420,7 +1420,7 @@
           <a:p>
             <a:fld id="{4D0BBD41-1117-4791-B15E-D06494A852BF}" type="datetimeFigureOut">
               <a:rPr lang="en-GB" smtClean="0"/>
-              <a:t>02/04/2024</a:t>
+              <a:t>03/04/2024</a:t>
             </a:fld>
             <a:endParaRPr lang="en-GB"/>
           </a:p>
@@ -1835,7 +1835,7 @@
           <a:p>
             <a:fld id="{4D0BBD41-1117-4791-B15E-D06494A852BF}" type="datetimeFigureOut">
               <a:rPr lang="en-GB" smtClean="0"/>
-              <a:t>02/04/2024</a:t>
+              <a:t>03/04/2024</a:t>
             </a:fld>
             <a:endParaRPr lang="en-GB"/>
           </a:p>
@@ -1977,7 +1977,7 @@
           <a:p>
             <a:fld id="{4D0BBD41-1117-4791-B15E-D06494A852BF}" type="datetimeFigureOut">
               <a:rPr lang="en-GB" smtClean="0"/>
-              <a:t>02/04/2024</a:t>
+              <a:t>03/04/2024</a:t>
             </a:fld>
             <a:endParaRPr lang="en-GB"/>
           </a:p>
@@ -2090,7 +2090,7 @@
           <a:p>
             <a:fld id="{4D0BBD41-1117-4791-B15E-D06494A852BF}" type="datetimeFigureOut">
               <a:rPr lang="en-GB" smtClean="0"/>
-              <a:t>02/04/2024</a:t>
+              <a:t>03/04/2024</a:t>
             </a:fld>
             <a:endParaRPr lang="en-GB"/>
           </a:p>
@@ -2403,7 +2403,7 @@
           <a:p>
             <a:fld id="{4D0BBD41-1117-4791-B15E-D06494A852BF}" type="datetimeFigureOut">
               <a:rPr lang="en-GB" smtClean="0"/>
-              <a:t>02/04/2024</a:t>
+              <a:t>03/04/2024</a:t>
             </a:fld>
             <a:endParaRPr lang="en-GB"/>
           </a:p>
@@ -2692,7 +2692,7 @@
           <a:p>
             <a:fld id="{4D0BBD41-1117-4791-B15E-D06494A852BF}" type="datetimeFigureOut">
               <a:rPr lang="en-GB" smtClean="0"/>
-              <a:t>02/04/2024</a:t>
+              <a:t>03/04/2024</a:t>
             </a:fld>
             <a:endParaRPr lang="en-GB"/>
           </a:p>
@@ -2935,7 +2935,7 @@
           <a:p>
             <a:fld id="{4D0BBD41-1117-4791-B15E-D06494A852BF}" type="datetimeFigureOut">
               <a:rPr lang="en-GB" smtClean="0"/>
-              <a:t>02/04/2024</a:t>
+              <a:t>03/04/2024</a:t>
             </a:fld>
             <a:endParaRPr lang="en-GB"/>
           </a:p>
@@ -5286,7 +5286,15 @@
               </a:pPr>
               <a:r>
                 <a:rPr lang="en-US" sz="2000" kern="1200" dirty="0"/>
-                <a:t>JS calculates the 5 closest (Euclidean distance) books and displays recommendation</a:t>
+                <a:t>JS calculates the 5 closest (Euclidean distance) books in the same cluster of the </a:t>
+              </a:r>
+              <a:r>
+                <a:rPr lang="en-US" sz="2000" kern="1200"/>
+                <a:t>chosen book </a:t>
+              </a:r>
+              <a:r>
+                <a:rPr lang="en-US" sz="2000" kern="1200" dirty="0"/>
+                <a:t>and displays recommendation</a:t>
               </a:r>
             </a:p>
           </p:txBody>
@@ -5644,7 +5652,7 @@
             </a:pPr>
             <a:r>
               <a:rPr lang="en-US" sz="2400" kern="1200" dirty="0"/>
-              <a:t>Complex dataset – models not very stable, although same model always the best</a:t>
+              <a:t>Complex dataset with several categorical features</a:t>
             </a:r>
           </a:p>
           <a:p>

</xml_diff>